<commit_message>
DB add Ronaks graphs 12.8
</commit_message>
<xml_diff>
--- a/Project-1-AirportAirlineAnalysis-dec2019.pptx
+++ b/Project-1-AirportAirlineAnalysis-dec2019.pptx
@@ -3583,6 +3583,38 @@
           </a:p>
         </p:txBody>
       </p:sp>
+      <p:sp>
+        <p:nvSpPr>
+          <p:cNvPr id="4" name="TextBox 3">
+            <a:extLst>
+              <a:ext uri="{FF2B5EF4-FFF2-40B4-BE49-F238E27FC236}">
+                <a16:creationId xmlns:a16="http://schemas.microsoft.com/office/drawing/2014/main" id="{3A95121E-FEB3-204C-B7FE-2EAB39D037CE}"/>
+              </a:ext>
+            </a:extLst>
+          </p:cNvPr>
+          <p:cNvSpPr txBox="1"/>
+          <p:nvPr/>
+        </p:nvSpPr>
+        <p:spPr>
+          <a:xfrm>
+            <a:off x="11858625" y="1771650"/>
+            <a:ext cx="184731" cy="369332"/>
+          </a:xfrm>
+          <a:prstGeom prst="rect">
+            <a:avLst/>
+          </a:prstGeom>
+          <a:noFill/>
+        </p:spPr>
+        <p:txBody>
+          <a:bodyPr wrap="none" rtlCol="0">
+            <a:spAutoFit/>
+          </a:bodyPr>
+          <a:lstStyle/>
+          <a:p>
+            <a:endParaRPr lang="en-US"/>
+          </a:p>
+        </p:txBody>
+      </p:sp>
     </p:spTree>
     <p:extLst>
       <p:ext uri="{BB962C8B-B14F-4D97-AF65-F5344CB8AC3E}">

</xml_diff>

<commit_message>
2nd commit, printed Ronak graphs to .png
</commit_message>
<xml_diff>
--- a/Project-1-AirportAirlineAnalysis-dec2019.pptx
+++ b/Project-1-AirportAirlineAnalysis-dec2019.pptx
@@ -3583,38 +3583,6 @@
           </a:p>
         </p:txBody>
       </p:sp>
-      <p:sp>
-        <p:nvSpPr>
-          <p:cNvPr id="4" name="TextBox 3">
-            <a:extLst>
-              <a:ext uri="{FF2B5EF4-FFF2-40B4-BE49-F238E27FC236}">
-                <a16:creationId xmlns:a16="http://schemas.microsoft.com/office/drawing/2014/main" id="{3A95121E-FEB3-204C-B7FE-2EAB39D037CE}"/>
-              </a:ext>
-            </a:extLst>
-          </p:cNvPr>
-          <p:cNvSpPr txBox="1"/>
-          <p:nvPr/>
-        </p:nvSpPr>
-        <p:spPr>
-          <a:xfrm>
-            <a:off x="11858625" y="1771650"/>
-            <a:ext cx="184731" cy="369332"/>
-          </a:xfrm>
-          <a:prstGeom prst="rect">
-            <a:avLst/>
-          </a:prstGeom>
-          <a:noFill/>
-        </p:spPr>
-        <p:txBody>
-          <a:bodyPr wrap="none" rtlCol="0">
-            <a:spAutoFit/>
-          </a:bodyPr>
-          <a:lstStyle/>
-          <a:p>
-            <a:endParaRPr lang="en-US"/>
-          </a:p>
-        </p:txBody>
-      </p:sp>
     </p:spTree>
     <p:extLst>
       <p:ext uri="{BB962C8B-B14F-4D97-AF65-F5344CB8AC3E}">

</xml_diff>

<commit_message>
DB updates to presentation
</commit_message>
<xml_diff>
--- a/Project-1-AirportAirlineAnalysis-dec2019.pptx
+++ b/Project-1-AirportAirlineAnalysis-dec2019.pptx
@@ -10,7 +10,10 @@
     <p:sldId id="258" r:id="rId4"/>
     <p:sldId id="259" r:id="rId5"/>
     <p:sldId id="260" r:id="rId6"/>
-    <p:sldId id="261" r:id="rId7"/>
+    <p:sldId id="263" r:id="rId7"/>
+    <p:sldId id="261" r:id="rId8"/>
+    <p:sldId id="262" r:id="rId9"/>
+    <p:sldId id="264" r:id="rId10"/>
   </p:sldIdLst>
   <p:sldSz cx="12192000" cy="6858000"/>
   <p:notesSz cx="6858000" cy="9144000"/>
@@ -109,6 +112,11 @@
       </a:defRPr>
     </a:lvl9pPr>
   </p:defaultTextStyle>
+  <p:extLst>
+    <p:ext uri="{EFAFB233-063F-42B5-8137-9DF3F51BA10A}">
+      <p15:sldGuideLst xmlns:p15="http://schemas.microsoft.com/office/powerpoint/2012/main"/>
+    </p:ext>
+  </p:extLst>
 </p:presentation>
 </file>
 
@@ -259,7 +267,7 @@
           <a:p>
             <a:fld id="{23A95A0D-2431-8E49-95AD-B30BD2478D7D}" type="datetimeFigureOut">
               <a:rPr lang="en-US" smtClean="0"/>
-              <a:t>12/7/19</a:t>
+              <a:t>12/10/19</a:t>
             </a:fld>
             <a:endParaRPr lang="en-US"/>
           </a:p>
@@ -457,7 +465,7 @@
           <a:p>
             <a:fld id="{23A95A0D-2431-8E49-95AD-B30BD2478D7D}" type="datetimeFigureOut">
               <a:rPr lang="en-US" smtClean="0"/>
-              <a:t>12/7/19</a:t>
+              <a:t>12/10/19</a:t>
             </a:fld>
             <a:endParaRPr lang="en-US"/>
           </a:p>
@@ -665,7 +673,7 @@
           <a:p>
             <a:fld id="{23A95A0D-2431-8E49-95AD-B30BD2478D7D}" type="datetimeFigureOut">
               <a:rPr lang="en-US" smtClean="0"/>
-              <a:t>12/7/19</a:t>
+              <a:t>12/10/19</a:t>
             </a:fld>
             <a:endParaRPr lang="en-US"/>
           </a:p>
@@ -863,7 +871,7 @@
           <a:p>
             <a:fld id="{23A95A0D-2431-8E49-95AD-B30BD2478D7D}" type="datetimeFigureOut">
               <a:rPr lang="en-US" smtClean="0"/>
-              <a:t>12/7/19</a:t>
+              <a:t>12/10/19</a:t>
             </a:fld>
             <a:endParaRPr lang="en-US"/>
           </a:p>
@@ -1138,7 +1146,7 @@
           <a:p>
             <a:fld id="{23A95A0D-2431-8E49-95AD-B30BD2478D7D}" type="datetimeFigureOut">
               <a:rPr lang="en-US" smtClean="0"/>
-              <a:t>12/7/19</a:t>
+              <a:t>12/10/19</a:t>
             </a:fld>
             <a:endParaRPr lang="en-US"/>
           </a:p>
@@ -1403,7 +1411,7 @@
           <a:p>
             <a:fld id="{23A95A0D-2431-8E49-95AD-B30BD2478D7D}" type="datetimeFigureOut">
               <a:rPr lang="en-US" smtClean="0"/>
-              <a:t>12/7/19</a:t>
+              <a:t>12/10/19</a:t>
             </a:fld>
             <a:endParaRPr lang="en-US"/>
           </a:p>
@@ -1815,7 +1823,7 @@
           <a:p>
             <a:fld id="{23A95A0D-2431-8E49-95AD-B30BD2478D7D}" type="datetimeFigureOut">
               <a:rPr lang="en-US" smtClean="0"/>
-              <a:t>12/7/19</a:t>
+              <a:t>12/10/19</a:t>
             </a:fld>
             <a:endParaRPr lang="en-US"/>
           </a:p>
@@ -1956,7 +1964,7 @@
           <a:p>
             <a:fld id="{23A95A0D-2431-8E49-95AD-B30BD2478D7D}" type="datetimeFigureOut">
               <a:rPr lang="en-US" smtClean="0"/>
-              <a:t>12/7/19</a:t>
+              <a:t>12/10/19</a:t>
             </a:fld>
             <a:endParaRPr lang="en-US"/>
           </a:p>
@@ -2069,7 +2077,7 @@
           <a:p>
             <a:fld id="{23A95A0D-2431-8E49-95AD-B30BD2478D7D}" type="datetimeFigureOut">
               <a:rPr lang="en-US" smtClean="0"/>
-              <a:t>12/7/19</a:t>
+              <a:t>12/10/19</a:t>
             </a:fld>
             <a:endParaRPr lang="en-US"/>
           </a:p>
@@ -2380,7 +2388,7 @@
           <a:p>
             <a:fld id="{23A95A0D-2431-8E49-95AD-B30BD2478D7D}" type="datetimeFigureOut">
               <a:rPr lang="en-US" smtClean="0"/>
-              <a:t>12/7/19</a:t>
+              <a:t>12/10/19</a:t>
             </a:fld>
             <a:endParaRPr lang="en-US"/>
           </a:p>
@@ -2668,7 +2676,7 @@
           <a:p>
             <a:fld id="{23A95A0D-2431-8E49-95AD-B30BD2478D7D}" type="datetimeFigureOut">
               <a:rPr lang="en-US" smtClean="0"/>
-              <a:t>12/7/19</a:t>
+              <a:t>12/10/19</a:t>
             </a:fld>
             <a:endParaRPr lang="en-US"/>
           </a:p>
@@ -2909,7 +2917,7 @@
           <a:p>
             <a:fld id="{23A95A0D-2431-8E49-95AD-B30BD2478D7D}" type="datetimeFigureOut">
               <a:rPr lang="en-US" smtClean="0"/>
-              <a:t>12/7/19</a:t>
+              <a:t>12/10/19</a:t>
             </a:fld>
             <a:endParaRPr lang="en-US"/>
           </a:p>
@@ -3501,13 +3509,13 @@
         </p:nvSpPr>
         <p:spPr>
           <a:xfrm>
-            <a:off x="435429" y="1586140"/>
-            <a:ext cx="10515600" cy="4351338"/>
+            <a:off x="435428" y="1200374"/>
+            <a:ext cx="11400971" cy="4351338"/>
           </a:xfrm>
         </p:spPr>
         <p:txBody>
           <a:bodyPr>
-            <a:normAutofit fontScale="85000" lnSpcReduction="20000"/>
+            <a:normAutofit fontScale="77500" lnSpcReduction="20000"/>
           </a:bodyPr>
           <a:lstStyle/>
           <a:p>
@@ -3520,8 +3528,11 @@
             </a:r>
             <a:r>
               <a:rPr lang="en-US" dirty="0"/>
-              <a:t>: Our project looks to analyze commercial airline flights in the US in order to summarize timeliness of arrivals, and if arriving flights are delayed, the primary reason(s) for this (i.e. weather, carrier, mechanical issues, etc.) including how this varies by both, airline and airport.</a:t>
-            </a:r>
+              <a:t>: Our project looks to analyze commercial airline flights in the US in order to summarize timeliness of arrivals, and if arriving flights are delayed, the primary reason(s) for this (i.e. weather, carrier, mechanical issues, etc.) including how this varies by both, airline and airport. </a:t>
+            </a:r>
+          </a:p>
+          <a:p>
+            <a:endParaRPr lang="en-US" dirty="0"/>
           </a:p>
           <a:p>
             <a:pPr marL="0" indent="0">
@@ -3558,7 +3569,13 @@
             </a:r>
             <a:r>
               <a:rPr lang="en-US" dirty="0"/>
-              <a:t>: United States Department of Transportation, </a:t>
+              <a:t>: </a:t>
+            </a:r>
+          </a:p>
+          <a:p>
+            <a:r>
+              <a:rPr lang="en-US" dirty="0"/>
+              <a:t>United States Department of Transportation, </a:t>
             </a:r>
             <a:r>
               <a:rPr lang="en-US" dirty="0">
@@ -3566,7 +3583,16 @@
               </a:rPr>
               <a:t>Bureau of Transportation Statistics</a:t>
             </a:r>
-            <a:endParaRPr lang="en-US" dirty="0"/>
+            <a:r>
+              <a:rPr lang="en-US" dirty="0"/>
+              <a:t>,</a:t>
+            </a:r>
+          </a:p>
+          <a:p>
+            <a:r>
+              <a:rPr lang="en-US" dirty="0"/>
+              <a:t>Google Maps (API)</a:t>
+            </a:r>
           </a:p>
           <a:p>
             <a:pPr marL="0" indent="0">
@@ -3619,10 +3645,10 @@
       </p:grpSpPr>
       <p:pic>
         <p:nvPicPr>
-          <p:cNvPr id="24" name="Picture 23" descr="A screenshot of a cell phone&#10;&#10;Description automatically generated">
-            <a:extLst>
-              <a:ext uri="{FF2B5EF4-FFF2-40B4-BE49-F238E27FC236}">
-                <a16:creationId xmlns:a16="http://schemas.microsoft.com/office/drawing/2014/main" id="{00BFD81F-0720-7D43-8139-1B430F974C5C}"/>
+          <p:cNvPr id="3" name="Picture 2" descr="A screenshot of a cell phone&#10;&#10;Description automatically generated">
+            <a:extLst>
+              <a:ext uri="{FF2B5EF4-FFF2-40B4-BE49-F238E27FC236}">
+                <a16:creationId xmlns:a16="http://schemas.microsoft.com/office/drawing/2014/main" id="{5551E02B-C2BF-F34D-9050-4EF85B63EEC6}"/>
               </a:ext>
             </a:extLst>
           </p:cNvPr>
@@ -3639,236 +3665,14 @@
         </p:blipFill>
         <p:spPr>
           <a:xfrm>
-            <a:off x="409576" y="1328736"/>
-            <a:ext cx="11144247" cy="3714749"/>
+            <a:off x="849795" y="288775"/>
+            <a:ext cx="10492409" cy="6295445"/>
           </a:xfrm>
           <a:prstGeom prst="rect">
             <a:avLst/>
           </a:prstGeom>
         </p:spPr>
       </p:pic>
-      <p:sp>
-        <p:nvSpPr>
-          <p:cNvPr id="28" name="TextBox 27">
-            <a:extLst>
-              <a:ext uri="{FF2B5EF4-FFF2-40B4-BE49-F238E27FC236}">
-                <a16:creationId xmlns:a16="http://schemas.microsoft.com/office/drawing/2014/main" id="{DB0F8AAC-F654-3848-B92C-FD622A5B5AC4}"/>
-              </a:ext>
-            </a:extLst>
-          </p:cNvPr>
-          <p:cNvSpPr txBox="1"/>
-          <p:nvPr/>
-        </p:nvSpPr>
-        <p:spPr>
-          <a:xfrm>
-            <a:off x="528638" y="85636"/>
-            <a:ext cx="11134725" cy="1200329"/>
-          </a:xfrm>
-          <a:prstGeom prst="rect">
-            <a:avLst/>
-          </a:prstGeom>
-          <a:noFill/>
-        </p:spPr>
-        <p:txBody>
-          <a:bodyPr wrap="square" rtlCol="0">
-            <a:spAutoFit/>
-          </a:bodyPr>
-          <a:lstStyle/>
-          <a:p>
-            <a:r>
-              <a:rPr lang="en-US" dirty="0"/>
-              <a:t>To start, we aggregated domestic flight data from the Bureau of Transportation in order to identify the Top U.S. Airlines and Top U.S. Airports by total flight volume. </a:t>
-            </a:r>
-          </a:p>
-          <a:p>
-            <a:pPr marL="285750" indent="-285750">
-              <a:buFont typeface="Arial" panose="020B0604020202020204" pitchFamily="34" charset="0"/>
-              <a:buChar char="•"/>
-            </a:pPr>
-            <a:r>
-              <a:rPr lang="en-US" dirty="0"/>
-              <a:t>The following graphs illustrate the 18 top airlines by flight count as well as the 25 top airports in the U.S. by flight count</a:t>
-            </a:r>
-          </a:p>
-        </p:txBody>
-      </p:sp>
-      <p:sp>
-        <p:nvSpPr>
-          <p:cNvPr id="30" name="Oval 29">
-            <a:extLst>
-              <a:ext uri="{FF2B5EF4-FFF2-40B4-BE49-F238E27FC236}">
-                <a16:creationId xmlns:a16="http://schemas.microsoft.com/office/drawing/2014/main" id="{2B3BC30B-C0A6-5B4F-9128-F9CFCE5A765C}"/>
-              </a:ext>
-            </a:extLst>
-          </p:cNvPr>
-          <p:cNvSpPr/>
-          <p:nvPr/>
-        </p:nvSpPr>
-        <p:spPr>
-          <a:xfrm>
-            <a:off x="9472614" y="1757359"/>
-            <a:ext cx="442913" cy="471487"/>
-          </a:xfrm>
-          <a:prstGeom prst="ellipse">
-            <a:avLst/>
-          </a:prstGeom>
-          <a:solidFill>
-            <a:schemeClr val="accent6">
-              <a:lumMod val="40000"/>
-              <a:lumOff val="60000"/>
-            </a:schemeClr>
-          </a:solidFill>
-        </p:spPr>
-        <p:style>
-          <a:lnRef idx="2">
-            <a:schemeClr val="accent1">
-              <a:shade val="50000"/>
-            </a:schemeClr>
-          </a:lnRef>
-          <a:fillRef idx="1">
-            <a:schemeClr val="accent1"/>
-          </a:fillRef>
-          <a:effectRef idx="0">
-            <a:schemeClr val="accent1"/>
-          </a:effectRef>
-          <a:fontRef idx="minor">
-            <a:schemeClr val="lt1"/>
-          </a:fontRef>
-        </p:style>
-        <p:txBody>
-          <a:bodyPr rtlCol="0" anchor="ctr"/>
-          <a:lstStyle/>
-          <a:p>
-            <a:pPr algn="ctr"/>
-            <a:r>
-              <a:rPr lang="en-US" b="1" dirty="0">
-                <a:solidFill>
-                  <a:schemeClr val="tx1"/>
-                </a:solidFill>
-              </a:rPr>
-              <a:t>1</a:t>
-            </a:r>
-          </a:p>
-        </p:txBody>
-      </p:sp>
-      <p:sp>
-        <p:nvSpPr>
-          <p:cNvPr id="31" name="Oval 30">
-            <a:extLst>
-              <a:ext uri="{FF2B5EF4-FFF2-40B4-BE49-F238E27FC236}">
-                <a16:creationId xmlns:a16="http://schemas.microsoft.com/office/drawing/2014/main" id="{A4BFB1D6-B7B2-464E-B2B3-DC41C787ABED}"/>
-              </a:ext>
-            </a:extLst>
-          </p:cNvPr>
-          <p:cNvSpPr/>
-          <p:nvPr/>
-        </p:nvSpPr>
-        <p:spPr>
-          <a:xfrm>
-            <a:off x="3231351" y="2293321"/>
-            <a:ext cx="442913" cy="471487"/>
-          </a:xfrm>
-          <a:prstGeom prst="ellipse">
-            <a:avLst/>
-          </a:prstGeom>
-          <a:solidFill>
-            <a:schemeClr val="accent6">
-              <a:lumMod val="40000"/>
-              <a:lumOff val="60000"/>
-            </a:schemeClr>
-          </a:solidFill>
-        </p:spPr>
-        <p:style>
-          <a:lnRef idx="2">
-            <a:schemeClr val="accent1">
-              <a:shade val="50000"/>
-            </a:schemeClr>
-          </a:lnRef>
-          <a:fillRef idx="1">
-            <a:schemeClr val="accent1"/>
-          </a:fillRef>
-          <a:effectRef idx="0">
-            <a:schemeClr val="accent1"/>
-          </a:effectRef>
-          <a:fontRef idx="minor">
-            <a:schemeClr val="lt1"/>
-          </a:fontRef>
-        </p:style>
-        <p:txBody>
-          <a:bodyPr rtlCol="0" anchor="ctr"/>
-          <a:lstStyle/>
-          <a:p>
-            <a:pPr algn="ctr"/>
-            <a:r>
-              <a:rPr lang="en-US" b="1" dirty="0">
-                <a:solidFill>
-                  <a:schemeClr val="tx1"/>
-                </a:solidFill>
-              </a:rPr>
-              <a:t>2</a:t>
-            </a:r>
-          </a:p>
-        </p:txBody>
-      </p:sp>
-      <p:sp>
-        <p:nvSpPr>
-          <p:cNvPr id="32" name="Oval 31">
-            <a:extLst>
-              <a:ext uri="{FF2B5EF4-FFF2-40B4-BE49-F238E27FC236}">
-                <a16:creationId xmlns:a16="http://schemas.microsoft.com/office/drawing/2014/main" id="{EF1B1D41-580B-0F45-8193-103B6E9E416E}"/>
-              </a:ext>
-            </a:extLst>
-          </p:cNvPr>
-          <p:cNvSpPr/>
-          <p:nvPr/>
-        </p:nvSpPr>
-        <p:spPr>
-          <a:xfrm>
-            <a:off x="2714623" y="2550305"/>
-            <a:ext cx="442913" cy="471487"/>
-          </a:xfrm>
-          <a:prstGeom prst="ellipse">
-            <a:avLst/>
-          </a:prstGeom>
-          <a:solidFill>
-            <a:schemeClr val="accent6">
-              <a:lumMod val="40000"/>
-              <a:lumOff val="60000"/>
-            </a:schemeClr>
-          </a:solidFill>
-        </p:spPr>
-        <p:style>
-          <a:lnRef idx="2">
-            <a:schemeClr val="accent1">
-              <a:shade val="50000"/>
-            </a:schemeClr>
-          </a:lnRef>
-          <a:fillRef idx="1">
-            <a:schemeClr val="accent1"/>
-          </a:fillRef>
-          <a:effectRef idx="0">
-            <a:schemeClr val="accent1"/>
-          </a:effectRef>
-          <a:fontRef idx="minor">
-            <a:schemeClr val="lt1"/>
-          </a:fontRef>
-        </p:style>
-        <p:txBody>
-          <a:bodyPr rtlCol="0" anchor="ctr"/>
-          <a:lstStyle/>
-          <a:p>
-            <a:pPr algn="ctr"/>
-            <a:r>
-              <a:rPr lang="en-US" b="1" dirty="0">
-                <a:solidFill>
-                  <a:schemeClr val="tx1"/>
-                </a:solidFill>
-              </a:rPr>
-              <a:t>3</a:t>
-            </a:r>
-          </a:p>
-        </p:txBody>
-      </p:sp>
     </p:spTree>
     <p:extLst>
       <p:ext uri="{BB962C8B-B14F-4D97-AF65-F5344CB8AC3E}">
@@ -3901,10 +3705,10 @@
       </p:grpSpPr>
       <p:pic>
         <p:nvPicPr>
-          <p:cNvPr id="7" name="Picture 6" descr="A screenshot of a cell phone&#10;&#10;Description automatically generated">
-            <a:extLst>
-              <a:ext uri="{FF2B5EF4-FFF2-40B4-BE49-F238E27FC236}">
-                <a16:creationId xmlns:a16="http://schemas.microsoft.com/office/drawing/2014/main" id="{470940FA-4DFC-6D45-90F3-0352495B49C9}"/>
+          <p:cNvPr id="3" name="Picture 2" descr="A screenshot of a cell phone&#10;&#10;Description automatically generated">
+            <a:extLst>
+              <a:ext uri="{FF2B5EF4-FFF2-40B4-BE49-F238E27FC236}">
+                <a16:creationId xmlns:a16="http://schemas.microsoft.com/office/drawing/2014/main" id="{A800695B-DE3C-1C4E-844E-DCC19F9843D0}"/>
               </a:ext>
             </a:extLst>
           </p:cNvPr>
@@ -3921,8 +3725,8 @@
         </p:blipFill>
         <p:spPr>
           <a:xfrm>
-            <a:off x="133350" y="1441450"/>
-            <a:ext cx="11925300" cy="3975100"/>
+            <a:off x="200439" y="1463813"/>
+            <a:ext cx="11791122" cy="3930374"/>
           </a:xfrm>
           <a:prstGeom prst="rect">
             <a:avLst/>
@@ -3959,56 +3763,36 @@
           <a:chExt cx="0" cy="0"/>
         </a:xfrm>
       </p:grpSpPr>
-      <p:sp>
-        <p:nvSpPr>
-          <p:cNvPr id="2" name="Title 1">
-            <a:extLst>
-              <a:ext uri="{FF2B5EF4-FFF2-40B4-BE49-F238E27FC236}">
-                <a16:creationId xmlns:a16="http://schemas.microsoft.com/office/drawing/2014/main" id="{61F150C1-1942-D24C-B941-F62A55A27189}"/>
-              </a:ext>
-            </a:extLst>
-          </p:cNvPr>
-          <p:cNvSpPr>
-            <a:spLocks noGrp="1"/>
-          </p:cNvSpPr>
-          <p:nvPr>
-            <p:ph type="title"/>
-          </p:nvPr>
-        </p:nvSpPr>
-        <p:spPr/>
-        <p:txBody>
-          <a:bodyPr/>
-          <a:lstStyle/>
-          <a:p>
-            <a:endParaRPr lang="en-US"/>
-          </a:p>
-        </p:txBody>
-      </p:sp>
-      <p:sp>
-        <p:nvSpPr>
-          <p:cNvPr id="3" name="Content Placeholder 2">
-            <a:extLst>
-              <a:ext uri="{FF2B5EF4-FFF2-40B4-BE49-F238E27FC236}">
-                <a16:creationId xmlns:a16="http://schemas.microsoft.com/office/drawing/2014/main" id="{C60D2F60-3284-3848-8044-2FB901CA0AA1}"/>
-              </a:ext>
-            </a:extLst>
-          </p:cNvPr>
-          <p:cNvSpPr>
-            <a:spLocks noGrp="1"/>
-          </p:cNvSpPr>
-          <p:nvPr>
-            <p:ph idx="1"/>
-          </p:nvPr>
-        </p:nvSpPr>
-        <p:spPr/>
-        <p:txBody>
-          <a:bodyPr/>
-          <a:lstStyle/>
-          <a:p>
-            <a:endParaRPr lang="en-US"/>
-          </a:p>
-        </p:txBody>
-      </p:sp>
+      <p:pic>
+        <p:nvPicPr>
+          <p:cNvPr id="9" name="Picture 8" descr="A screenshot of a cell phone&#10;&#10;Description automatically generated">
+            <a:extLst>
+              <a:ext uri="{FF2B5EF4-FFF2-40B4-BE49-F238E27FC236}">
+                <a16:creationId xmlns:a16="http://schemas.microsoft.com/office/drawing/2014/main" id="{5EEA2B00-45FB-144E-BA94-814B4395EF20}"/>
+              </a:ext>
+            </a:extLst>
+          </p:cNvPr>
+          <p:cNvPicPr>
+            <a:picLocks noChangeAspect="1"/>
+          </p:cNvPicPr>
+          <p:nvPr/>
+        </p:nvPicPr>
+        <p:blipFill>
+          <a:blip r:embed="rId2"/>
+          <a:stretch>
+            <a:fillRect/>
+          </a:stretch>
+        </p:blipFill>
+        <p:spPr>
+          <a:xfrm>
+            <a:off x="0" y="76469"/>
+            <a:ext cx="12192000" cy="6705061"/>
+          </a:xfrm>
+          <a:prstGeom prst="rect">
+            <a:avLst/>
+          </a:prstGeom>
+        </p:spPr>
+      </p:pic>
     </p:spTree>
     <p:extLst>
       <p:ext uri="{BB962C8B-B14F-4D97-AF65-F5344CB8AC3E}">
@@ -4039,52 +3823,416 @@
           <a:chExt cx="0" cy="0"/>
         </a:xfrm>
       </p:grpSpPr>
-      <p:sp>
-        <p:nvSpPr>
-          <p:cNvPr id="2" name="Title 1">
-            <a:extLst>
-              <a:ext uri="{FF2B5EF4-FFF2-40B4-BE49-F238E27FC236}">
-                <a16:creationId xmlns:a16="http://schemas.microsoft.com/office/drawing/2014/main" id="{985B7D71-50F7-7A41-9A0C-F50C595141F8}"/>
-              </a:ext>
-            </a:extLst>
-          </p:cNvPr>
-          <p:cNvSpPr>
-            <a:spLocks noGrp="1"/>
-          </p:cNvSpPr>
-          <p:nvPr>
-            <p:ph type="title"/>
-          </p:nvPr>
-        </p:nvSpPr>
-        <p:spPr/>
-        <p:txBody>
-          <a:bodyPr/>
-          <a:lstStyle/>
-          <a:p>
-            <a:endParaRPr lang="en-US" dirty="0"/>
-          </a:p>
-        </p:txBody>
-      </p:sp>
-      <p:sp>
-        <p:nvSpPr>
-          <p:cNvPr id="3" name="Content Placeholder 2">
-            <a:extLst>
-              <a:ext uri="{FF2B5EF4-FFF2-40B4-BE49-F238E27FC236}">
-                <a16:creationId xmlns:a16="http://schemas.microsoft.com/office/drawing/2014/main" id="{27CDC35D-0291-D341-B2F6-9DCC482A1513}"/>
-              </a:ext>
-            </a:extLst>
-          </p:cNvPr>
-          <p:cNvSpPr>
-            <a:spLocks noGrp="1"/>
-          </p:cNvSpPr>
-          <p:nvPr>
-            <p:ph idx="1"/>
-          </p:nvPr>
-        </p:nvSpPr>
-        <p:spPr/>
-        <p:txBody>
-          <a:bodyPr/>
-          <a:lstStyle/>
-          <a:p>
+      <p:pic>
+        <p:nvPicPr>
+          <p:cNvPr id="5" name="Picture 4" descr="A picture containing accessory, umbrella&#10;&#10;Description automatically generated">
+            <a:extLst>
+              <a:ext uri="{FF2B5EF4-FFF2-40B4-BE49-F238E27FC236}">
+                <a16:creationId xmlns:a16="http://schemas.microsoft.com/office/drawing/2014/main" id="{139165D8-D941-9A47-9C8A-DFE23C7F6F8A}"/>
+              </a:ext>
+            </a:extLst>
+          </p:cNvPr>
+          <p:cNvPicPr>
+            <a:picLocks noChangeAspect="1"/>
+          </p:cNvPicPr>
+          <p:nvPr/>
+        </p:nvPicPr>
+        <p:blipFill>
+          <a:blip r:embed="rId2"/>
+          <a:stretch>
+            <a:fillRect/>
+          </a:stretch>
+        </p:blipFill>
+        <p:spPr>
+          <a:xfrm>
+            <a:off x="6698298" y="1147152"/>
+            <a:ext cx="5317877" cy="4015227"/>
+          </a:xfrm>
+          <a:prstGeom prst="rect">
+            <a:avLst/>
+          </a:prstGeom>
+        </p:spPr>
+      </p:pic>
+      <p:pic>
+        <p:nvPicPr>
+          <p:cNvPr id="7" name="Picture 6" descr="A screenshot of a cell phone&#10;&#10;Description automatically generated">
+            <a:extLst>
+              <a:ext uri="{FF2B5EF4-FFF2-40B4-BE49-F238E27FC236}">
+                <a16:creationId xmlns:a16="http://schemas.microsoft.com/office/drawing/2014/main" id="{DBCF0F1B-1C76-A940-B2C8-88E78EC9A47F}"/>
+              </a:ext>
+            </a:extLst>
+          </p:cNvPr>
+          <p:cNvPicPr>
+            <a:picLocks noChangeAspect="1"/>
+          </p:cNvPicPr>
+          <p:nvPr/>
+        </p:nvPicPr>
+        <p:blipFill>
+          <a:blip r:embed="rId3"/>
+          <a:stretch>
+            <a:fillRect/>
+          </a:stretch>
+        </p:blipFill>
+        <p:spPr>
+          <a:xfrm>
+            <a:off x="155701" y="1147152"/>
+            <a:ext cx="6310519" cy="3965713"/>
+          </a:xfrm>
+          <a:prstGeom prst="rect">
+            <a:avLst/>
+          </a:prstGeom>
+        </p:spPr>
+      </p:pic>
+      <p:sp>
+        <p:nvSpPr>
+          <p:cNvPr id="9" name="TextBox 8">
+            <a:extLst>
+              <a:ext uri="{FF2B5EF4-FFF2-40B4-BE49-F238E27FC236}">
+                <a16:creationId xmlns:a16="http://schemas.microsoft.com/office/drawing/2014/main" id="{D93395A4-A7D4-1647-8B4C-4A44BA642AE3}"/>
+              </a:ext>
+            </a:extLst>
+          </p:cNvPr>
+          <p:cNvSpPr txBox="1"/>
+          <p:nvPr/>
+        </p:nvSpPr>
+        <p:spPr>
+          <a:xfrm>
+            <a:off x="1113905" y="315884"/>
+            <a:ext cx="3956859" cy="369332"/>
+          </a:xfrm>
+          <a:prstGeom prst="rect">
+            <a:avLst/>
+          </a:prstGeom>
+          <a:noFill/>
+        </p:spPr>
+        <p:txBody>
+          <a:bodyPr wrap="square" rtlCol="0">
+            <a:spAutoFit/>
+          </a:bodyPr>
+          <a:lstStyle/>
+          <a:p>
+            <a:pPr algn="ctr"/>
+            <a:r>
+              <a:rPr lang="en-US" b="1" u="sng" dirty="0"/>
+              <a:t>Total Delay Percentage by U.S. Airport</a:t>
+            </a:r>
+          </a:p>
+        </p:txBody>
+      </p:sp>
+      <p:sp>
+        <p:nvSpPr>
+          <p:cNvPr id="10" name="TextBox 9">
+            <a:extLst>
+              <a:ext uri="{FF2B5EF4-FFF2-40B4-BE49-F238E27FC236}">
+                <a16:creationId xmlns:a16="http://schemas.microsoft.com/office/drawing/2014/main" id="{34011F33-E9C3-3841-A67D-111830FBCC84}"/>
+              </a:ext>
+            </a:extLst>
+          </p:cNvPr>
+          <p:cNvSpPr txBox="1"/>
+          <p:nvPr/>
+        </p:nvSpPr>
+        <p:spPr>
+          <a:xfrm>
+            <a:off x="7497044" y="315884"/>
+            <a:ext cx="3956859" cy="369332"/>
+          </a:xfrm>
+          <a:prstGeom prst="rect">
+            <a:avLst/>
+          </a:prstGeom>
+          <a:noFill/>
+        </p:spPr>
+        <p:txBody>
+          <a:bodyPr wrap="square" rtlCol="0">
+            <a:spAutoFit/>
+          </a:bodyPr>
+          <a:lstStyle/>
+          <a:p>
+            <a:pPr algn="ctr"/>
+            <a:r>
+              <a:rPr lang="en-US" b="1" u="sng" dirty="0"/>
+              <a:t>Delay Causes as a Percentage of Total</a:t>
+            </a:r>
+          </a:p>
+        </p:txBody>
+      </p:sp>
+      <p:cxnSp>
+        <p:nvCxnSpPr>
+          <p:cNvPr id="12" name="Straight Connector 11">
+            <a:extLst>
+              <a:ext uri="{FF2B5EF4-FFF2-40B4-BE49-F238E27FC236}">
+                <a16:creationId xmlns:a16="http://schemas.microsoft.com/office/drawing/2014/main" id="{79D660BD-6BA2-8B4A-9F7F-57D3642CF28B}"/>
+              </a:ext>
+            </a:extLst>
+          </p:cNvPr>
+          <p:cNvCxnSpPr/>
+          <p:nvPr/>
+        </p:nvCxnSpPr>
+        <p:spPr>
+          <a:xfrm>
+            <a:off x="6616934" y="818216"/>
+            <a:ext cx="0" cy="4984064"/>
+          </a:xfrm>
+          <a:prstGeom prst="line">
+            <a:avLst/>
+          </a:prstGeom>
+        </p:spPr>
+        <p:style>
+          <a:lnRef idx="1">
+            <a:schemeClr val="accent1"/>
+          </a:lnRef>
+          <a:fillRef idx="0">
+            <a:schemeClr val="accent1"/>
+          </a:fillRef>
+          <a:effectRef idx="0">
+            <a:schemeClr val="accent1"/>
+          </a:effectRef>
+          <a:fontRef idx="minor">
+            <a:schemeClr val="tx1"/>
+          </a:fontRef>
+        </p:style>
+      </p:cxnSp>
+    </p:spTree>
+    <p:extLst>
+      <p:ext uri="{BB962C8B-B14F-4D97-AF65-F5344CB8AC3E}">
+        <p14:creationId xmlns:p14="http://schemas.microsoft.com/office/powerpoint/2010/main" val="3533257472"/>
+      </p:ext>
+    </p:extLst>
+  </p:cSld>
+  <p:clrMapOvr>
+    <a:masterClrMapping/>
+  </p:clrMapOvr>
+</p:sld>
+</file>
+
+<file path=ppt/slides/slide7.xml><?xml version="1.0" encoding="utf-8"?>
+<p:sld xmlns:a="http://schemas.openxmlformats.org/drawingml/2006/main" xmlns:r="http://schemas.openxmlformats.org/officeDocument/2006/relationships" xmlns:p="http://schemas.openxmlformats.org/presentationml/2006/main">
+  <p:cSld>
+    <p:spTree>
+      <p:nvGrpSpPr>
+        <p:cNvPr id="1" name=""/>
+        <p:cNvGrpSpPr/>
+        <p:nvPr/>
+      </p:nvGrpSpPr>
+      <p:grpSpPr>
+        <a:xfrm>
+          <a:off x="0" y="0"/>
+          <a:ext cx="0" cy="0"/>
+          <a:chOff x="0" y="0"/>
+          <a:chExt cx="0" cy="0"/>
+        </a:xfrm>
+      </p:grpSpPr>
+      <p:pic>
+        <p:nvPicPr>
+          <p:cNvPr id="4" name="Picture 3" descr="A screenshot of a cell phone&#10;&#10;Description automatically generated">
+            <a:extLst>
+              <a:ext uri="{FF2B5EF4-FFF2-40B4-BE49-F238E27FC236}">
+                <a16:creationId xmlns:a16="http://schemas.microsoft.com/office/drawing/2014/main" id="{A5BE0293-1790-2F41-B0B5-80DE4865ED0D}"/>
+              </a:ext>
+            </a:extLst>
+          </p:cNvPr>
+          <p:cNvPicPr>
+            <a:picLocks noChangeAspect="1"/>
+          </p:cNvPicPr>
+          <p:nvPr/>
+        </p:nvPicPr>
+        <p:blipFill>
+          <a:blip r:embed="rId2"/>
+          <a:stretch>
+            <a:fillRect/>
+          </a:stretch>
+        </p:blipFill>
+        <p:spPr>
+          <a:xfrm>
+            <a:off x="770872" y="990259"/>
+            <a:ext cx="10484005" cy="5770517"/>
+          </a:xfrm>
+          <a:prstGeom prst="rect">
+            <a:avLst/>
+          </a:prstGeom>
+        </p:spPr>
+      </p:pic>
+      <p:sp>
+        <p:nvSpPr>
+          <p:cNvPr id="5" name="Oval 4">
+            <a:extLst>
+              <a:ext uri="{FF2B5EF4-FFF2-40B4-BE49-F238E27FC236}">
+                <a16:creationId xmlns:a16="http://schemas.microsoft.com/office/drawing/2014/main" id="{1F9B0252-D5D7-8A43-9694-1E26D2E0A699}"/>
+              </a:ext>
+            </a:extLst>
+          </p:cNvPr>
+          <p:cNvSpPr/>
+          <p:nvPr/>
+        </p:nvSpPr>
+        <p:spPr>
+          <a:xfrm>
+            <a:off x="9053484" y="1482205"/>
+            <a:ext cx="116378" cy="116379"/>
+          </a:xfrm>
+          <a:prstGeom prst="ellipse">
+            <a:avLst/>
+          </a:prstGeom>
+          <a:solidFill>
+            <a:schemeClr val="accent4"/>
+          </a:solidFill>
+          <a:ln>
+            <a:noFill/>
+          </a:ln>
+        </p:spPr>
+        <p:style>
+          <a:lnRef idx="2">
+            <a:schemeClr val="accent1">
+              <a:shade val="50000"/>
+            </a:schemeClr>
+          </a:lnRef>
+          <a:fillRef idx="1">
+            <a:schemeClr val="accent1"/>
+          </a:fillRef>
+          <a:effectRef idx="0">
+            <a:schemeClr val="accent1"/>
+          </a:effectRef>
+          <a:fontRef idx="minor">
+            <a:schemeClr val="lt1"/>
+          </a:fontRef>
+        </p:style>
+        <p:txBody>
+          <a:bodyPr rtlCol="0" anchor="ctr"/>
+          <a:lstStyle/>
+          <a:p>
+            <a:pPr algn="ctr"/>
+            <a:endParaRPr lang="en-US" sz="1200"/>
+          </a:p>
+        </p:txBody>
+      </p:sp>
+      <p:sp>
+        <p:nvSpPr>
+          <p:cNvPr id="6" name="TextBox 5">
+            <a:extLst>
+              <a:ext uri="{FF2B5EF4-FFF2-40B4-BE49-F238E27FC236}">
+                <a16:creationId xmlns:a16="http://schemas.microsoft.com/office/drawing/2014/main" id="{42BAF154-66F8-424A-8C4B-2087FFE4D09C}"/>
+              </a:ext>
+            </a:extLst>
+          </p:cNvPr>
+          <p:cNvSpPr txBox="1"/>
+          <p:nvPr/>
+        </p:nvSpPr>
+        <p:spPr>
+          <a:xfrm>
+            <a:off x="9169862" y="1402143"/>
+            <a:ext cx="2227811" cy="276999"/>
+          </a:xfrm>
+          <a:prstGeom prst="rect">
+            <a:avLst/>
+          </a:prstGeom>
+          <a:noFill/>
+        </p:spPr>
+        <p:txBody>
+          <a:bodyPr wrap="square" rtlCol="0">
+            <a:spAutoFit/>
+          </a:bodyPr>
+          <a:lstStyle/>
+          <a:p>
+            <a:r>
+              <a:rPr lang="en-US" sz="1200" dirty="0"/>
+              <a:t>Delay percentage</a:t>
+            </a:r>
+          </a:p>
+        </p:txBody>
+      </p:sp>
+      <p:sp>
+        <p:nvSpPr>
+          <p:cNvPr id="7" name="TextBox 6">
+            <a:extLst>
+              <a:ext uri="{FF2B5EF4-FFF2-40B4-BE49-F238E27FC236}">
+                <a16:creationId xmlns:a16="http://schemas.microsoft.com/office/drawing/2014/main" id="{192DDACD-8ACF-1F47-9F84-40FD58D4C4CF}"/>
+              </a:ext>
+            </a:extLst>
+          </p:cNvPr>
+          <p:cNvSpPr txBox="1"/>
+          <p:nvPr/>
+        </p:nvSpPr>
+        <p:spPr>
+          <a:xfrm>
+            <a:off x="419100" y="215900"/>
+            <a:ext cx="11277600" cy="646331"/>
+          </a:xfrm>
+          <a:prstGeom prst="rect">
+            <a:avLst/>
+          </a:prstGeom>
+          <a:noFill/>
+        </p:spPr>
+        <p:txBody>
+          <a:bodyPr wrap="square" rtlCol="0">
+            <a:spAutoFit/>
+          </a:bodyPr>
+          <a:lstStyle/>
+          <a:p>
+            <a:r>
+              <a:rPr lang="en-US" b="1" dirty="0"/>
+              <a:t>Total number of flights</a:t>
+            </a:r>
+            <a:r>
+              <a:rPr lang="en-US" dirty="0"/>
+              <a:t> by top 25 U.S. airport including </a:t>
+            </a:r>
+            <a:r>
+              <a:rPr lang="en-US" b="1" dirty="0"/>
+              <a:t>percentage of flight delays </a:t>
+            </a:r>
+            <a:r>
+              <a:rPr lang="en-US" dirty="0"/>
+              <a:t>for each compared to the median delay percentage.  </a:t>
+            </a:r>
+          </a:p>
+        </p:txBody>
+      </p:sp>
+      <p:sp>
+        <p:nvSpPr>
+          <p:cNvPr id="8" name="Oval 7">
+            <a:extLst>
+              <a:ext uri="{FF2B5EF4-FFF2-40B4-BE49-F238E27FC236}">
+                <a16:creationId xmlns:a16="http://schemas.microsoft.com/office/drawing/2014/main" id="{CDAB61D6-94B8-674B-A999-0285DF44747E}"/>
+              </a:ext>
+            </a:extLst>
+          </p:cNvPr>
+          <p:cNvSpPr/>
+          <p:nvPr/>
+        </p:nvSpPr>
+        <p:spPr>
+          <a:xfrm>
+            <a:off x="7616142" y="2928397"/>
+            <a:ext cx="335666" cy="324092"/>
+          </a:xfrm>
+          <a:prstGeom prst="ellipse">
+            <a:avLst/>
+          </a:prstGeom>
+          <a:noFill/>
+          <a:ln>
+            <a:solidFill>
+              <a:srgbClr val="FF0000"/>
+            </a:solidFill>
+          </a:ln>
+        </p:spPr>
+        <p:style>
+          <a:lnRef idx="2">
+            <a:schemeClr val="accent1">
+              <a:shade val="50000"/>
+            </a:schemeClr>
+          </a:lnRef>
+          <a:fillRef idx="1">
+            <a:schemeClr val="accent1"/>
+          </a:fillRef>
+          <a:effectRef idx="0">
+            <a:schemeClr val="accent1"/>
+          </a:effectRef>
+          <a:fontRef idx="minor">
+            <a:schemeClr val="lt1"/>
+          </a:fontRef>
+        </p:style>
+        <p:txBody>
+          <a:bodyPr rtlCol="0" anchor="ctr"/>
+          <a:lstStyle/>
+          <a:p>
+            <a:pPr algn="ctr"/>
             <a:endParaRPr lang="en-US"/>
           </a:p>
         </p:txBody>
@@ -4093,6 +4241,731 @@
     <p:extLst>
       <p:ext uri="{BB962C8B-B14F-4D97-AF65-F5344CB8AC3E}">
         <p14:creationId xmlns:p14="http://schemas.microsoft.com/office/powerpoint/2010/main" val="2818730465"/>
+      </p:ext>
+    </p:extLst>
+  </p:cSld>
+  <p:clrMapOvr>
+    <a:masterClrMapping/>
+  </p:clrMapOvr>
+</p:sld>
+</file>
+
+<file path=ppt/slides/slide8.xml><?xml version="1.0" encoding="utf-8"?>
+<p:sld xmlns:a="http://schemas.openxmlformats.org/drawingml/2006/main" xmlns:r="http://schemas.openxmlformats.org/officeDocument/2006/relationships" xmlns:p="http://schemas.openxmlformats.org/presentationml/2006/main">
+  <p:cSld>
+    <p:spTree>
+      <p:nvGrpSpPr>
+        <p:cNvPr id="1" name=""/>
+        <p:cNvGrpSpPr/>
+        <p:nvPr/>
+      </p:nvGrpSpPr>
+      <p:grpSpPr>
+        <a:xfrm>
+          <a:off x="0" y="0"/>
+          <a:ext cx="0" cy="0"/>
+          <a:chOff x="0" y="0"/>
+          <a:chExt cx="0" cy="0"/>
+        </a:xfrm>
+      </p:grpSpPr>
+      <p:pic>
+        <p:nvPicPr>
+          <p:cNvPr id="5" name="Picture 4" descr="A screenshot of a cell phone&#10;&#10;Description automatically generated">
+            <a:extLst>
+              <a:ext uri="{FF2B5EF4-FFF2-40B4-BE49-F238E27FC236}">
+                <a16:creationId xmlns:a16="http://schemas.microsoft.com/office/drawing/2014/main" id="{A6B52F3D-759C-D142-BF3A-6411673005B2}"/>
+              </a:ext>
+            </a:extLst>
+          </p:cNvPr>
+          <p:cNvPicPr>
+            <a:picLocks noChangeAspect="1"/>
+          </p:cNvPicPr>
+          <p:nvPr/>
+        </p:nvPicPr>
+        <p:blipFill>
+          <a:blip r:embed="rId2"/>
+          <a:stretch>
+            <a:fillRect/>
+          </a:stretch>
+        </p:blipFill>
+        <p:spPr>
+          <a:xfrm>
+            <a:off x="199057" y="208167"/>
+            <a:ext cx="11552583" cy="3850861"/>
+          </a:xfrm>
+          <a:prstGeom prst="rect">
+            <a:avLst/>
+          </a:prstGeom>
+        </p:spPr>
+      </p:pic>
+      <p:graphicFrame>
+        <p:nvGraphicFramePr>
+          <p:cNvPr id="7" name="Table 6">
+            <a:extLst>
+              <a:ext uri="{FF2B5EF4-FFF2-40B4-BE49-F238E27FC236}">
+                <a16:creationId xmlns:a16="http://schemas.microsoft.com/office/drawing/2014/main" id="{0DD23146-4F54-474C-B1BC-7755D92A40F5}"/>
+              </a:ext>
+            </a:extLst>
+          </p:cNvPr>
+          <p:cNvGraphicFramePr>
+            <a:graphicFrameLocks noGrp="1"/>
+          </p:cNvGraphicFramePr>
+          <p:nvPr>
+            <p:extLst>
+              <p:ext uri="{D42A27DB-BD31-4B8C-83A1-F6EECF244321}">
+                <p14:modId xmlns:p14="http://schemas.microsoft.com/office/powerpoint/2010/main" val="2690576907"/>
+              </p:ext>
+            </p:extLst>
+          </p:nvPr>
+        </p:nvGraphicFramePr>
+        <p:xfrm>
+          <a:off x="698500" y="4059028"/>
+          <a:ext cx="10236200" cy="2560320"/>
+        </p:xfrm>
+        <a:graphic>
+          <a:graphicData uri="http://schemas.openxmlformats.org/drawingml/2006/table">
+            <a:tbl>
+              <a:tblPr>
+                <a:tableStyleId>{2D5ABB26-0587-4C30-8999-92F81FD0307C}</a:tableStyleId>
+              </a:tblPr>
+              <a:tblGrid>
+                <a:gridCol w="1282700">
+                  <a:extLst>
+                    <a:ext uri="{9D8B030D-6E8A-4147-A177-3AD203B41FA5}">
+                      <a16:colId xmlns:a16="http://schemas.microsoft.com/office/drawing/2014/main" val="1561978766"/>
+                    </a:ext>
+                  </a:extLst>
+                </a:gridCol>
+                <a:gridCol w="3798312">
+                  <a:extLst>
+                    <a:ext uri="{9D8B030D-6E8A-4147-A177-3AD203B41FA5}">
+                      <a16:colId xmlns:a16="http://schemas.microsoft.com/office/drawing/2014/main" val="2373290220"/>
+                    </a:ext>
+                  </a:extLst>
+                </a:gridCol>
+                <a:gridCol w="2596138">
+                  <a:extLst>
+                    <a:ext uri="{9D8B030D-6E8A-4147-A177-3AD203B41FA5}">
+                      <a16:colId xmlns:a16="http://schemas.microsoft.com/office/drawing/2014/main" val="1651183939"/>
+                    </a:ext>
+                  </a:extLst>
+                </a:gridCol>
+                <a:gridCol w="2559050">
+                  <a:extLst>
+                    <a:ext uri="{9D8B030D-6E8A-4147-A177-3AD203B41FA5}">
+                      <a16:colId xmlns:a16="http://schemas.microsoft.com/office/drawing/2014/main" val="3323380002"/>
+                    </a:ext>
+                  </a:extLst>
+                </a:gridCol>
+              </a:tblGrid>
+              <a:tr h="0">
+                <a:tc>
+                  <a:txBody>
+                    <a:bodyPr/>
+                    <a:lstStyle/>
+                    <a:p>
+                      <a:pPr algn="r" fontAlgn="ctr"/>
+                      <a:r>
+                        <a:rPr lang="en-US" dirty="0">
+                          <a:effectLst/>
+                        </a:rPr>
+                        <a:t>Rank</a:t>
+                      </a:r>
+                      <a:endParaRPr lang="en-US" b="1" dirty="0">
+                        <a:effectLst/>
+                      </a:endParaRPr>
+                    </a:p>
+                  </a:txBody>
+                  <a:tcPr anchor="ctr"/>
+                </a:tc>
+                <a:tc>
+                  <a:txBody>
+                    <a:bodyPr/>
+                    <a:lstStyle/>
+                    <a:p>
+                      <a:pPr algn="l" fontAlgn="ctr"/>
+                      <a:r>
+                        <a:rPr lang="en-US" dirty="0">
+                          <a:effectLst/>
+                        </a:rPr>
+                        <a:t>Airline</a:t>
+                      </a:r>
+                      <a:endParaRPr lang="en-US" b="1" dirty="0">
+                        <a:effectLst/>
+                      </a:endParaRPr>
+                    </a:p>
+                  </a:txBody>
+                  <a:tcPr anchor="ctr"/>
+                </a:tc>
+                <a:tc>
+                  <a:txBody>
+                    <a:bodyPr/>
+                    <a:lstStyle/>
+                    <a:p>
+                      <a:pPr algn="r" fontAlgn="ctr"/>
+                      <a:r>
+                        <a:rPr lang="en-US" dirty="0">
+                          <a:effectLst/>
+                        </a:rPr>
+                        <a:t>Flight Count</a:t>
+                      </a:r>
+                      <a:endParaRPr lang="en-US" b="1" dirty="0">
+                        <a:effectLst/>
+                      </a:endParaRPr>
+                    </a:p>
+                  </a:txBody>
+                  <a:tcPr anchor="ctr"/>
+                </a:tc>
+                <a:tc>
+                  <a:txBody>
+                    <a:bodyPr/>
+                    <a:lstStyle/>
+                    <a:p>
+                      <a:r>
+                        <a:rPr lang="en-US" dirty="0"/>
+                        <a:t>Delay Percentage</a:t>
+                      </a:r>
+                    </a:p>
+                  </a:txBody>
+                  <a:tcPr/>
+                </a:tc>
+                <a:extLst>
+                  <a:ext uri="{0D108BD9-81ED-4DB2-BD59-A6C34878D82A}">
+                    <a16:rowId xmlns:a16="http://schemas.microsoft.com/office/drawing/2014/main" val="1669385293"/>
+                  </a:ext>
+                </a:extLst>
+              </a:tr>
+              <a:tr h="0">
+                <a:tc>
+                  <a:txBody>
+                    <a:bodyPr/>
+                    <a:lstStyle/>
+                    <a:p>
+                      <a:pPr algn="r" fontAlgn="ctr"/>
+                      <a:r>
+                        <a:rPr lang="en-US" dirty="0">
+                          <a:effectLst/>
+                        </a:rPr>
+                        <a:t>0</a:t>
+                      </a:r>
+                      <a:endParaRPr lang="en-US" b="1" dirty="0">
+                        <a:effectLst/>
+                      </a:endParaRPr>
+                    </a:p>
+                  </a:txBody>
+                  <a:tcPr anchor="ctr"/>
+                </a:tc>
+                <a:tc>
+                  <a:txBody>
+                    <a:bodyPr/>
+                    <a:lstStyle/>
+                    <a:p>
+                      <a:pPr algn="l" fontAlgn="ctr"/>
+                      <a:r>
+                        <a:rPr lang="en-US" dirty="0">
+                          <a:effectLst/>
+                        </a:rPr>
+                        <a:t>ExpressJet Airlines LLC</a:t>
+                      </a:r>
+                    </a:p>
+                  </a:txBody>
+                  <a:tcPr anchor="ctr"/>
+                </a:tc>
+                <a:tc>
+                  <a:txBody>
+                    <a:bodyPr/>
+                    <a:lstStyle/>
+                    <a:p>
+                      <a:pPr algn="r" fontAlgn="ctr"/>
+                      <a:r>
+                        <a:rPr lang="en-US" dirty="0">
+                          <a:effectLst/>
+                        </a:rPr>
+                        <a:t>21086.17</a:t>
+                      </a:r>
+                    </a:p>
+                  </a:txBody>
+                  <a:tcPr anchor="ctr"/>
+                </a:tc>
+                <a:tc>
+                  <a:txBody>
+                    <a:bodyPr/>
+                    <a:lstStyle/>
+                    <a:p>
+                      <a:pPr algn="r" fontAlgn="ctr"/>
+                      <a:r>
+                        <a:rPr lang="en-US" dirty="0">
+                          <a:effectLst/>
+                        </a:rPr>
+                        <a:t>32.79%</a:t>
+                      </a:r>
+                    </a:p>
+                  </a:txBody>
+                  <a:tcPr anchor="ctr"/>
+                </a:tc>
+                <a:extLst>
+                  <a:ext uri="{0D108BD9-81ED-4DB2-BD59-A6C34878D82A}">
+                    <a16:rowId xmlns:a16="http://schemas.microsoft.com/office/drawing/2014/main" val="3777635038"/>
+                  </a:ext>
+                </a:extLst>
+              </a:tr>
+              <a:tr h="0">
+                <a:tc>
+                  <a:txBody>
+                    <a:bodyPr/>
+                    <a:lstStyle/>
+                    <a:p>
+                      <a:pPr algn="r" fontAlgn="ctr"/>
+                      <a:r>
+                        <a:rPr lang="en-US" dirty="0">
+                          <a:effectLst/>
+                        </a:rPr>
+                        <a:t>1</a:t>
+                      </a:r>
+                      <a:endParaRPr lang="en-US" b="1" dirty="0">
+                        <a:effectLst/>
+                      </a:endParaRPr>
+                    </a:p>
+                  </a:txBody>
+                  <a:tcPr anchor="ctr"/>
+                </a:tc>
+                <a:tc>
+                  <a:txBody>
+                    <a:bodyPr/>
+                    <a:lstStyle/>
+                    <a:p>
+                      <a:pPr algn="l" fontAlgn="ctr"/>
+                      <a:r>
+                        <a:rPr lang="en-US" dirty="0">
+                          <a:effectLst/>
+                        </a:rPr>
+                        <a:t>Frontier Airlines Inc.</a:t>
+                      </a:r>
+                    </a:p>
+                  </a:txBody>
+                  <a:tcPr anchor="ctr"/>
+                </a:tc>
+                <a:tc>
+                  <a:txBody>
+                    <a:bodyPr/>
+                    <a:lstStyle/>
+                    <a:p>
+                      <a:pPr algn="r" fontAlgn="ctr"/>
+                      <a:r>
+                        <a:rPr lang="en-US" dirty="0">
+                          <a:effectLst/>
+                        </a:rPr>
+                        <a:t>39393.26</a:t>
+                      </a:r>
+                    </a:p>
+                  </a:txBody>
+                  <a:tcPr anchor="ctr"/>
+                </a:tc>
+                <a:tc>
+                  <a:txBody>
+                    <a:bodyPr/>
+                    <a:lstStyle/>
+                    <a:p>
+                      <a:pPr algn="r" fontAlgn="ctr"/>
+                      <a:r>
+                        <a:rPr lang="en-US" dirty="0">
+                          <a:effectLst/>
+                        </a:rPr>
+                        <a:t>28.60%</a:t>
+                      </a:r>
+                    </a:p>
+                  </a:txBody>
+                  <a:tcPr anchor="ctr"/>
+                </a:tc>
+                <a:extLst>
+                  <a:ext uri="{0D108BD9-81ED-4DB2-BD59-A6C34878D82A}">
+                    <a16:rowId xmlns:a16="http://schemas.microsoft.com/office/drawing/2014/main" val="2575755822"/>
+                  </a:ext>
+                </a:extLst>
+              </a:tr>
+              <a:tr h="0">
+                <a:tc>
+                  <a:txBody>
+                    <a:bodyPr/>
+                    <a:lstStyle/>
+                    <a:p>
+                      <a:pPr algn="r" fontAlgn="ctr"/>
+                      <a:r>
+                        <a:rPr lang="en-US">
+                          <a:effectLst/>
+                        </a:rPr>
+                        <a:t>2</a:t>
+                      </a:r>
+                      <a:endParaRPr lang="en-US" b="1">
+                        <a:effectLst/>
+                      </a:endParaRPr>
+                    </a:p>
+                  </a:txBody>
+                  <a:tcPr anchor="ctr"/>
+                </a:tc>
+                <a:tc>
+                  <a:txBody>
+                    <a:bodyPr/>
+                    <a:lstStyle/>
+                    <a:p>
+                      <a:pPr algn="l" fontAlgn="ctr"/>
+                      <a:r>
+                        <a:rPr lang="en-US" dirty="0">
+                          <a:effectLst/>
+                        </a:rPr>
+                        <a:t>ExpressJet Airlines Inc.</a:t>
+                      </a:r>
+                    </a:p>
+                  </a:txBody>
+                  <a:tcPr anchor="ctr"/>
+                </a:tc>
+                <a:tc>
+                  <a:txBody>
+                    <a:bodyPr/>
+                    <a:lstStyle/>
+                    <a:p>
+                      <a:pPr algn="r" fontAlgn="ctr"/>
+                      <a:r>
+                        <a:rPr lang="en-US" dirty="0">
+                          <a:effectLst/>
+                        </a:rPr>
+                        <a:t>26378.96</a:t>
+                      </a:r>
+                    </a:p>
+                  </a:txBody>
+                  <a:tcPr anchor="ctr"/>
+                </a:tc>
+                <a:tc>
+                  <a:txBody>
+                    <a:bodyPr/>
+                    <a:lstStyle/>
+                    <a:p>
+                      <a:pPr algn="r" fontAlgn="ctr"/>
+                      <a:r>
+                        <a:rPr lang="en-US" dirty="0">
+                          <a:effectLst/>
+                        </a:rPr>
+                        <a:t>27.32%</a:t>
+                      </a:r>
+                    </a:p>
+                  </a:txBody>
+                  <a:tcPr anchor="ctr"/>
+                </a:tc>
+                <a:extLst>
+                  <a:ext uri="{0D108BD9-81ED-4DB2-BD59-A6C34878D82A}">
+                    <a16:rowId xmlns:a16="http://schemas.microsoft.com/office/drawing/2014/main" val="2602320495"/>
+                  </a:ext>
+                </a:extLst>
+              </a:tr>
+              <a:tr h="0">
+                <a:tc>
+                  <a:txBody>
+                    <a:bodyPr/>
+                    <a:lstStyle/>
+                    <a:p>
+                      <a:pPr algn="r" fontAlgn="ctr"/>
+                      <a:r>
+                        <a:rPr lang="en-US">
+                          <a:effectLst/>
+                        </a:rPr>
+                        <a:t>3</a:t>
+                      </a:r>
+                      <a:endParaRPr lang="en-US" b="1">
+                        <a:effectLst/>
+                      </a:endParaRPr>
+                    </a:p>
+                  </a:txBody>
+                  <a:tcPr anchor="ctr"/>
+                </a:tc>
+                <a:tc>
+                  <a:txBody>
+                    <a:bodyPr/>
+                    <a:lstStyle/>
+                    <a:p>
+                      <a:pPr algn="l" fontAlgn="ctr"/>
+                      <a:r>
+                        <a:rPr lang="en-US" dirty="0">
+                          <a:effectLst/>
+                        </a:rPr>
+                        <a:t>JetBlue Airways</a:t>
+                      </a:r>
+                    </a:p>
+                  </a:txBody>
+                  <a:tcPr anchor="ctr"/>
+                </a:tc>
+                <a:tc>
+                  <a:txBody>
+                    <a:bodyPr/>
+                    <a:lstStyle/>
+                    <a:p>
+                      <a:pPr algn="r" fontAlgn="ctr"/>
+                      <a:r>
+                        <a:rPr lang="en-US" dirty="0">
+                          <a:effectLst/>
+                        </a:rPr>
+                        <a:t>81252.91</a:t>
+                      </a:r>
+                    </a:p>
+                  </a:txBody>
+                  <a:tcPr anchor="ctr"/>
+                </a:tc>
+                <a:tc>
+                  <a:txBody>
+                    <a:bodyPr/>
+                    <a:lstStyle/>
+                    <a:p>
+                      <a:pPr algn="r" fontAlgn="ctr"/>
+                      <a:r>
+                        <a:rPr lang="en-US" dirty="0">
+                          <a:effectLst/>
+                        </a:rPr>
+                        <a:t>26.39%</a:t>
+                      </a:r>
+                    </a:p>
+                  </a:txBody>
+                  <a:tcPr anchor="ctr"/>
+                </a:tc>
+                <a:extLst>
+                  <a:ext uri="{0D108BD9-81ED-4DB2-BD59-A6C34878D82A}">
+                    <a16:rowId xmlns:a16="http://schemas.microsoft.com/office/drawing/2014/main" val="1398823619"/>
+                  </a:ext>
+                </a:extLst>
+              </a:tr>
+              <a:tr h="0">
+                <a:tc>
+                  <a:txBody>
+                    <a:bodyPr/>
+                    <a:lstStyle/>
+                    <a:p>
+                      <a:pPr algn="r" fontAlgn="ctr"/>
+                      <a:r>
+                        <a:rPr lang="en-US">
+                          <a:effectLst/>
+                        </a:rPr>
+                        <a:t>4</a:t>
+                      </a:r>
+                      <a:endParaRPr lang="en-US" b="1">
+                        <a:effectLst/>
+                      </a:endParaRPr>
+                    </a:p>
+                  </a:txBody>
+                  <a:tcPr anchor="ctr"/>
+                </a:tc>
+                <a:tc>
+                  <a:txBody>
+                    <a:bodyPr/>
+                    <a:lstStyle/>
+                    <a:p>
+                      <a:pPr algn="l" fontAlgn="ctr"/>
+                      <a:r>
+                        <a:rPr lang="en-US" dirty="0">
+                          <a:effectLst/>
+                        </a:rPr>
+                        <a:t>Mesa Airlines Inc.</a:t>
+                      </a:r>
+                    </a:p>
+                  </a:txBody>
+                  <a:tcPr anchor="ctr"/>
+                </a:tc>
+                <a:tc>
+                  <a:txBody>
+                    <a:bodyPr/>
+                    <a:lstStyle/>
+                    <a:p>
+                      <a:pPr algn="r" fontAlgn="ctr"/>
+                      <a:r>
+                        <a:rPr lang="en-US" dirty="0">
+                          <a:effectLst/>
+                        </a:rPr>
+                        <a:t>60502.04</a:t>
+                      </a:r>
+                    </a:p>
+                  </a:txBody>
+                  <a:tcPr anchor="ctr"/>
+                </a:tc>
+                <a:tc>
+                  <a:txBody>
+                    <a:bodyPr/>
+                    <a:lstStyle/>
+                    <a:p>
+                      <a:pPr algn="r" fontAlgn="ctr"/>
+                      <a:r>
+                        <a:rPr lang="en-US" dirty="0">
+                          <a:effectLst/>
+                        </a:rPr>
+                        <a:t>24.59%</a:t>
+                      </a:r>
+                    </a:p>
+                  </a:txBody>
+                  <a:tcPr anchor="ctr"/>
+                </a:tc>
+                <a:extLst>
+                  <a:ext uri="{0D108BD9-81ED-4DB2-BD59-A6C34878D82A}">
+                    <a16:rowId xmlns:a16="http://schemas.microsoft.com/office/drawing/2014/main" val="1930893282"/>
+                  </a:ext>
+                </a:extLst>
+              </a:tr>
+              <a:tr h="0">
+                <a:tc>
+                  <a:txBody>
+                    <a:bodyPr/>
+                    <a:lstStyle/>
+                    <a:p>
+                      <a:pPr algn="r" fontAlgn="ctr"/>
+                      <a:r>
+                        <a:rPr lang="en-US">
+                          <a:effectLst/>
+                        </a:rPr>
+                        <a:t>5</a:t>
+                      </a:r>
+                      <a:endParaRPr lang="en-US" b="1">
+                        <a:effectLst/>
+                      </a:endParaRPr>
+                    </a:p>
+                  </a:txBody>
+                  <a:tcPr anchor="ctr"/>
+                </a:tc>
+                <a:tc>
+                  <a:txBody>
+                    <a:bodyPr/>
+                    <a:lstStyle/>
+                    <a:p>
+                      <a:pPr algn="l" fontAlgn="ctr"/>
+                      <a:r>
+                        <a:rPr lang="en-US" dirty="0">
+                          <a:effectLst/>
+                        </a:rPr>
+                        <a:t>Envoy Air</a:t>
+                      </a:r>
+                    </a:p>
+                  </a:txBody>
+                  <a:tcPr anchor="ctr"/>
+                </a:tc>
+                <a:tc>
+                  <a:txBody>
+                    <a:bodyPr/>
+                    <a:lstStyle/>
+                    <a:p>
+                      <a:pPr algn="r" fontAlgn="ctr"/>
+                      <a:r>
+                        <a:rPr lang="en-US">
+                          <a:effectLst/>
+                        </a:rPr>
+                        <a:t>83714.10</a:t>
+                      </a:r>
+                    </a:p>
+                  </a:txBody>
+                  <a:tcPr anchor="ctr"/>
+                </a:tc>
+                <a:tc>
+                  <a:txBody>
+                    <a:bodyPr/>
+                    <a:lstStyle/>
+                    <a:p>
+                      <a:pPr algn="r" fontAlgn="ctr"/>
+                      <a:r>
+                        <a:rPr lang="en-US" dirty="0">
+                          <a:effectLst/>
+                        </a:rPr>
+                        <a:t>24.11%</a:t>
+                      </a:r>
+                    </a:p>
+                  </a:txBody>
+                  <a:tcPr anchor="ctr"/>
+                </a:tc>
+                <a:extLst>
+                  <a:ext uri="{0D108BD9-81ED-4DB2-BD59-A6C34878D82A}">
+                    <a16:rowId xmlns:a16="http://schemas.microsoft.com/office/drawing/2014/main" val="2823802540"/>
+                  </a:ext>
+                </a:extLst>
+              </a:tr>
+            </a:tbl>
+          </a:graphicData>
+        </a:graphic>
+      </p:graphicFrame>
+    </p:spTree>
+    <p:extLst>
+      <p:ext uri="{BB962C8B-B14F-4D97-AF65-F5344CB8AC3E}">
+        <p14:creationId xmlns:p14="http://schemas.microsoft.com/office/powerpoint/2010/main" val="3289720850"/>
+      </p:ext>
+    </p:extLst>
+  </p:cSld>
+  <p:clrMapOvr>
+    <a:masterClrMapping/>
+  </p:clrMapOvr>
+</p:sld>
+</file>
+
+<file path=ppt/slides/slide9.xml><?xml version="1.0" encoding="utf-8"?>
+<p:sld xmlns:a="http://schemas.openxmlformats.org/drawingml/2006/main" xmlns:r="http://schemas.openxmlformats.org/officeDocument/2006/relationships" xmlns:p="http://schemas.openxmlformats.org/presentationml/2006/main">
+  <p:cSld>
+    <p:spTree>
+      <p:nvGrpSpPr>
+        <p:cNvPr id="1" name=""/>
+        <p:cNvGrpSpPr/>
+        <p:nvPr/>
+      </p:nvGrpSpPr>
+      <p:grpSpPr>
+        <a:xfrm>
+          <a:off x="0" y="0"/>
+          <a:ext cx="0" cy="0"/>
+          <a:chOff x="0" y="0"/>
+          <a:chExt cx="0" cy="0"/>
+        </a:xfrm>
+      </p:grpSpPr>
+      <p:sp>
+        <p:nvSpPr>
+          <p:cNvPr id="2" name="Title 1">
+            <a:extLst>
+              <a:ext uri="{FF2B5EF4-FFF2-40B4-BE49-F238E27FC236}">
+                <a16:creationId xmlns:a16="http://schemas.microsoft.com/office/drawing/2014/main" id="{9AD9A441-D4EB-1542-84E7-61F9E2785559}"/>
+              </a:ext>
+            </a:extLst>
+          </p:cNvPr>
+          <p:cNvSpPr>
+            <a:spLocks noGrp="1"/>
+          </p:cNvSpPr>
+          <p:nvPr>
+            <p:ph type="title"/>
+          </p:nvPr>
+        </p:nvSpPr>
+        <p:spPr/>
+        <p:txBody>
+          <a:bodyPr/>
+          <a:lstStyle/>
+          <a:p>
+            <a:endParaRPr lang="en-US"/>
+          </a:p>
+        </p:txBody>
+      </p:sp>
+      <p:sp>
+        <p:nvSpPr>
+          <p:cNvPr id="3" name="Content Placeholder 2">
+            <a:extLst>
+              <a:ext uri="{FF2B5EF4-FFF2-40B4-BE49-F238E27FC236}">
+                <a16:creationId xmlns:a16="http://schemas.microsoft.com/office/drawing/2014/main" id="{DA58495E-7C79-A24C-8982-375AFFAC6936}"/>
+              </a:ext>
+            </a:extLst>
+          </p:cNvPr>
+          <p:cNvSpPr>
+            <a:spLocks noGrp="1"/>
+          </p:cNvSpPr>
+          <p:nvPr>
+            <p:ph idx="1"/>
+          </p:nvPr>
+        </p:nvSpPr>
+        <p:spPr/>
+        <p:txBody>
+          <a:bodyPr/>
+          <a:lstStyle/>
+          <a:p>
+            <a:endParaRPr lang="en-US"/>
+          </a:p>
+        </p:txBody>
+      </p:sp>
+    </p:spTree>
+    <p:extLst>
+      <p:ext uri="{BB962C8B-B14F-4D97-AF65-F5344CB8AC3E}">
+        <p14:creationId xmlns:p14="http://schemas.microsoft.com/office/powerpoint/2010/main" val="104738105"/>
       </p:ext>
     </p:extLst>
   </p:cSld>

</xml_diff>